<commit_message>
Update code snippet in Web API deck
</commit_message>
<xml_diff>
--- a/Slides/4 - ASP.NET Web API.pptx
+++ b/Slides/4 - ASP.NET Web API.pptx
@@ -9339,8 +9339,8 @@
           </a:p>
         </p:txBody>
       </p:sp>
-      <mc:AlternateContent xmlns:mc="http://schemas.openxmlformats.org/markup-compatibility/2006">
-        <mc:Choice xmlns:we="http://schemas.microsoft.com/office/webextensions/webextension/2010/11" xmlns:pca="http://schemas.microsoft.com/office/powerpoint/2013/contentapp" Requires="we pca">
+      <mc:AlternateContent xmlns:mc="http://schemas.openxmlformats.org/markup-compatibility/2006" xmlns:we="http://schemas.microsoft.com/office/webextensions/webextension/2010/11" xmlns:pca="http://schemas.microsoft.com/office/powerpoint/2013/contentapp">
+        <mc:Choice Requires="we pca">
           <p:graphicFrame>
             <p:nvGraphicFramePr>
               <p:cNvPr id="5" name="App 4"/>
@@ -9366,7 +9366,7 @@
             </a:graphic>
           </p:graphicFrame>
         </mc:Choice>
-        <mc:Fallback>
+        <mc:Fallback xmlns="">
           <p:pic>
             <p:nvPicPr>
               <p:cNvPr id="5" name="App 4"/>
@@ -10183,8 +10183,8 @@
           </a:p>
         </p:txBody>
       </p:sp>
-      <mc:AlternateContent xmlns:mc="http://schemas.openxmlformats.org/markup-compatibility/2006">
-        <mc:Choice xmlns:we="http://schemas.microsoft.com/office/webextensions/webextension/2010/11" xmlns:pca="http://schemas.microsoft.com/office/powerpoint/2013/contentapp" Requires="we pca">
+      <mc:AlternateContent xmlns:mc="http://schemas.openxmlformats.org/markup-compatibility/2006" xmlns:we="http://schemas.microsoft.com/office/webextensions/webextension/2010/11" xmlns:pca="http://schemas.microsoft.com/office/powerpoint/2013/contentapp">
+        <mc:Choice Requires="we pca">
           <p:graphicFrame>
             <p:nvGraphicFramePr>
               <p:cNvPr id="4" name="App 3"/>
@@ -10210,7 +10210,7 @@
             </a:graphic>
           </p:graphicFrame>
         </mc:Choice>
-        <mc:Fallback>
+        <mc:Fallback xmlns="">
           <p:pic>
             <p:nvPicPr>
               <p:cNvPr id="4" name="App 3"/>
@@ -11695,6 +11695,108 @@
 </file>
 
 <file path=customXml/item1.xml><?xml version="1.0" encoding="utf-8"?>
+<?mso-contentType ?>
+<FormTemplates xmlns="http://schemas.microsoft.com/sharepoint/v3/contenttype/forms">
+  <Display>DocumentLibraryForm</Display>
+  <Edit>DocumentLibraryForm</Edit>
+  <New>DocumentLibraryForm</New>
+</FormTemplates>
+</file>
+
+<file path=customXml/item2.xml><?xml version="1.0" encoding="utf-8"?>
+<p:properties xmlns:p="http://schemas.microsoft.com/office/2006/metadata/properties" xmlns:xsi="http://www.w3.org/2001/XMLSchema-instance" xmlns:pc="http://schemas.microsoft.com/office/infopath/2007/PartnerControls">
+  <documentManagement>
+    <TaxCatchAll xmlns="230e9df3-be65-4c73-a93b-d1236ebd677e">
+      <Value>398</Value>
+      <Value>11</Value>
+      <Value>3</Value>
+      <Value>14</Value>
+    </TaxCatchAll>
+    <AverageRating xmlns="http://schemas.microsoft.com/sharepoint/v3" xsi:nil="true"/>
+    <Event_x0020_End_x0020_Date xmlns="e36bfbf9-5e42-489c-a259-4c54eb22cb57">2015-01-30T08:00:00+00:00</Event_x0020_End_x0020_Date>
+    <Event_x0020_Start_x0020_Date xmlns="e36bfbf9-5e42-489c-a259-4c54eb22cb57">2015-01-26T08:00:00+00:00</Event_x0020_Start_x0020_Date>
+    <MS_x0020_Speaker xmlns="e36bfbf9-5e42-489c-a259-4c54eb22cb57">
+      <UserInfo>
+        <DisplayName/>
+        <AccountId xsi:nil="true"/>
+        <AccountType/>
+      </UserInfo>
+    </MS_x0020_Speaker>
+    <External_x0020_Speaker xmlns="e36bfbf9-5e42-489c-a259-4c54eb22cb57" xsi:nil="true"/>
+    <Session_x0020_Code xmlns="e36bfbf9-5e42-489c-a259-4c54eb22cb57">DEV406</Session_x0020_Code>
+    <Presentation_x0020_Date xmlns="e36bfbf9-5e42-489c-a259-4c54eb22cb57">2015-01-26T00:00:00-08:00</Presentation_x0020_Date>
+    <MS_x0020_Content_x0020_Owner xmlns="e36bfbf9-5e42-489c-a259-4c54eb22cb57">
+      <UserInfo>
+        <DisplayName/>
+        <AccountId xsi:nil="true"/>
+        <AccountType/>
+      </UserInfo>
+    </MS_x0020_Content_x0020_Owner>
+    <o359a72c0e394a2bbc3ef6c803acc180 xmlns="e36bfbf9-5e42-489c-a259-4c54eb22cb57">
+      <Terms xmlns="http://schemas.microsoft.com/office/infopath/2007/PartnerControls">
+        <TermInfo xmlns="http://schemas.microsoft.com/office/infopath/2007/PartnerControls">
+          <TermName xmlns="http://schemas.microsoft.com/office/infopath/2007/PartnerControls">Washington State Convention and Trade Center</TermName>
+          <TermId xmlns="http://schemas.microsoft.com/office/infopath/2007/PartnerControls">2ebf141d-f871-4cc9-bf08-f87f112ab464</TermId>
+        </TermInfo>
+      </Terms>
+    </o359a72c0e394a2bbc3ef6c803acc180>
+    <LikesCount xmlns="http://schemas.microsoft.com/sharepoint/v3" xsi:nil="true"/>
+    <o05f84fa51b8493184c53e88c1048d4a xmlns="e36bfbf9-5e42-489c-a259-4c54eb22cb57">
+      <Terms xmlns="http://schemas.microsoft.com/office/infopath/2007/PartnerControls"/>
+    </o05f84fa51b8493184c53e88c1048d4a>
+    <Ratings xmlns="http://schemas.microsoft.com/sharepoint/v3" xsi:nil="true"/>
+    <g9dd8d57dc62470db6c80d9bb76f6f98 xmlns="e36bfbf9-5e42-489c-a259-4c54eb22cb57">
+      <Terms xmlns="http://schemas.microsoft.com/office/infopath/2007/PartnerControls"/>
+    </g9dd8d57dc62470db6c80d9bb76f6f98>
+    <ha6fe286c6b34f98b7bef39f1ccb86a0 xmlns="e36bfbf9-5e42-489c-a259-4c54eb22cb57">
+      <Terms xmlns="http://schemas.microsoft.com/office/infopath/2007/PartnerControls"/>
+    </ha6fe286c6b34f98b7bef39f1ccb86a0>
+    <LikedBy xmlns="http://schemas.microsoft.com/sharepoint/v3">
+      <UserInfo>
+        <DisplayName/>
+        <AccountId xsi:nil="true"/>
+        <AccountType/>
+      </UserInfo>
+    </LikedBy>
+    <o915802bd8fb417bbe5f6f423fd076a0 xmlns="e36bfbf9-5e42-489c-a259-4c54eb22cb57">
+      <Terms xmlns="http://schemas.microsoft.com/office/infopath/2007/PartnerControls"/>
+    </o915802bd8fb417bbe5f6f423fd076a0>
+    <TaxKeywordTaxHTField xmlns="230e9df3-be65-4c73-a93b-d1236ebd677e">
+      <Terms xmlns="http://schemas.microsoft.com/office/infopath/2007/PartnerControls">
+        <TermInfo xmlns="http://schemas.microsoft.com/office/infopath/2007/PartnerControls">
+          <TermName xmlns="http://schemas.microsoft.com/office/infopath/2007/PartnerControls">NDC - ASP.NET 5</TermName>
+          <TermId xmlns="http://schemas.microsoft.com/office/infopath/2007/PartnerControls">2a894afe-c5d7-4c19-abd1-299f20d98c6d</TermId>
+        </TermInfo>
+      </Terms>
+    </TaxKeywordTaxHTField>
+    <i23d7ba649194ae1bace8707520bbe5b xmlns="e36bfbf9-5e42-489c-a259-4c54eb22cb57">
+      <Terms xmlns="http://schemas.microsoft.com/office/infopath/2007/PartnerControls">
+        <TermInfo xmlns="http://schemas.microsoft.com/office/infopath/2007/PartnerControls">
+          <TermName xmlns="http://schemas.microsoft.com/office/infopath/2007/PartnerControls">TechReady</TermName>
+          <TermId xmlns="http://schemas.microsoft.com/office/infopath/2007/PartnerControls">ebdf1b7d-d34f-4ccf-ac45-ca5a756d5c65</TermId>
+        </TermInfo>
+      </Terms>
+    </i23d7ba649194ae1bace8707520bbe5b>
+    <l3c4e8b902d24cac82560b32d42c7cb4 xmlns="e36bfbf9-5e42-489c-a259-4c54eb22cb57">
+      <Terms xmlns="http://schemas.microsoft.com/office/infopath/2007/PartnerControls">
+        <TermInfo xmlns="http://schemas.microsoft.com/office/infopath/2007/PartnerControls">
+          <TermName xmlns="http://schemas.microsoft.com/office/infopath/2007/PartnerControls">Seattle</TermName>
+          <TermId xmlns="http://schemas.microsoft.com/office/infopath/2007/PartnerControls">54f46ed2-c77e-4a59-b182-a4171fdb0d11</TermId>
+        </TermInfo>
+      </Terms>
+    </l3c4e8b902d24cac82560b32d42c7cb4>
+    <RatedBy xmlns="http://schemas.microsoft.com/sharepoint/v3">
+      <UserInfo>
+        <DisplayName/>
+        <AccountId xsi:nil="true"/>
+        <AccountType/>
+      </UserInfo>
+    </RatedBy>
+  </documentManagement>
+</p:properties>
+</file>
+
+<file path=customXml/item3.xml><?xml version="1.0" encoding="utf-8"?>
 <ct:contentTypeSchema xmlns:ct="http://schemas.microsoft.com/office/2006/metadata/contentType" xmlns:ma="http://schemas.microsoft.com/office/2006/metadata/properties/metaAttributes" ct:_="" ma:_="" ma:contentTypeName="PresentationsDoc" ma:contentTypeID="0x010100CBE8A0D253ED1A4AAAE93FF9B973EB7E0027C1F5D9CEFE6046B3BCA4D310D11AA7" ma:contentTypeVersion="25" ma:contentTypeDescription="" ma:contentTypeScope="" ma:versionID="811ef41e954035cd29ce0c884bac93e3">
   <xsd:schema xmlns:xsd="http://www.w3.org/2001/XMLSchema" xmlns:xs="http://www.w3.org/2001/XMLSchema" xmlns:p="http://schemas.microsoft.com/office/2006/metadata/properties" xmlns:ns1="http://schemas.microsoft.com/sharepoint/v3" xmlns:ns2="e36bfbf9-5e42-489c-a259-4c54eb22cb57" xmlns:ns3="230e9df3-be65-4c73-a93b-d1236ebd677e" targetNamespace="http://schemas.microsoft.com/office/2006/metadata/properties" ma:root="true" ma:fieldsID="9c578a67b7ebda485b9f38997ab9a609" ns1:_="" ns2:_="" ns3:_="">
     <xsd:import namespace="http://schemas.microsoft.com/sharepoint/v3"/>
@@ -12070,124 +12172,10 @@
 </ct:contentTypeSchema>
 </file>
 
-<file path=customXml/item2.xml><?xml version="1.0" encoding="utf-8"?>
-<p:properties xmlns:p="http://schemas.microsoft.com/office/2006/metadata/properties" xmlns:xsi="http://www.w3.org/2001/XMLSchema-instance" xmlns:pc="http://schemas.microsoft.com/office/infopath/2007/PartnerControls">
-  <documentManagement>
-    <TaxCatchAll xmlns="230e9df3-be65-4c73-a93b-d1236ebd677e">
-      <Value>398</Value>
-      <Value>11</Value>
-      <Value>3</Value>
-      <Value>14</Value>
-    </TaxCatchAll>
-    <AverageRating xmlns="http://schemas.microsoft.com/sharepoint/v3" xsi:nil="true"/>
-    <Event_x0020_End_x0020_Date xmlns="e36bfbf9-5e42-489c-a259-4c54eb22cb57">2015-01-30T08:00:00+00:00</Event_x0020_End_x0020_Date>
-    <Event_x0020_Start_x0020_Date xmlns="e36bfbf9-5e42-489c-a259-4c54eb22cb57">2015-01-26T08:00:00+00:00</Event_x0020_Start_x0020_Date>
-    <MS_x0020_Speaker xmlns="e36bfbf9-5e42-489c-a259-4c54eb22cb57">
-      <UserInfo>
-        <DisplayName/>
-        <AccountId xsi:nil="true"/>
-        <AccountType/>
-      </UserInfo>
-    </MS_x0020_Speaker>
-    <External_x0020_Speaker xmlns="e36bfbf9-5e42-489c-a259-4c54eb22cb57" xsi:nil="true"/>
-    <Session_x0020_Code xmlns="e36bfbf9-5e42-489c-a259-4c54eb22cb57">DEV406</Session_x0020_Code>
-    <Presentation_x0020_Date xmlns="e36bfbf9-5e42-489c-a259-4c54eb22cb57">2015-01-26T00:00:00-08:00</Presentation_x0020_Date>
-    <MS_x0020_Content_x0020_Owner xmlns="e36bfbf9-5e42-489c-a259-4c54eb22cb57">
-      <UserInfo>
-        <DisplayName/>
-        <AccountId xsi:nil="true"/>
-        <AccountType/>
-      </UserInfo>
-    </MS_x0020_Content_x0020_Owner>
-    <o359a72c0e394a2bbc3ef6c803acc180 xmlns="e36bfbf9-5e42-489c-a259-4c54eb22cb57">
-      <Terms xmlns="http://schemas.microsoft.com/office/infopath/2007/PartnerControls">
-        <TermInfo xmlns="http://schemas.microsoft.com/office/infopath/2007/PartnerControls">
-          <TermName xmlns="http://schemas.microsoft.com/office/infopath/2007/PartnerControls">Washington State Convention and Trade Center</TermName>
-          <TermId xmlns="http://schemas.microsoft.com/office/infopath/2007/PartnerControls">2ebf141d-f871-4cc9-bf08-f87f112ab464</TermId>
-        </TermInfo>
-      </Terms>
-    </o359a72c0e394a2bbc3ef6c803acc180>
-    <LikesCount xmlns="http://schemas.microsoft.com/sharepoint/v3" xsi:nil="true"/>
-    <o05f84fa51b8493184c53e88c1048d4a xmlns="e36bfbf9-5e42-489c-a259-4c54eb22cb57">
-      <Terms xmlns="http://schemas.microsoft.com/office/infopath/2007/PartnerControls"/>
-    </o05f84fa51b8493184c53e88c1048d4a>
-    <Ratings xmlns="http://schemas.microsoft.com/sharepoint/v3" xsi:nil="true"/>
-    <g9dd8d57dc62470db6c80d9bb76f6f98 xmlns="e36bfbf9-5e42-489c-a259-4c54eb22cb57">
-      <Terms xmlns="http://schemas.microsoft.com/office/infopath/2007/PartnerControls"/>
-    </g9dd8d57dc62470db6c80d9bb76f6f98>
-    <ha6fe286c6b34f98b7bef39f1ccb86a0 xmlns="e36bfbf9-5e42-489c-a259-4c54eb22cb57">
-      <Terms xmlns="http://schemas.microsoft.com/office/infopath/2007/PartnerControls"/>
-    </ha6fe286c6b34f98b7bef39f1ccb86a0>
-    <LikedBy xmlns="http://schemas.microsoft.com/sharepoint/v3">
-      <UserInfo>
-        <DisplayName/>
-        <AccountId xsi:nil="true"/>
-        <AccountType/>
-      </UserInfo>
-    </LikedBy>
-    <o915802bd8fb417bbe5f6f423fd076a0 xmlns="e36bfbf9-5e42-489c-a259-4c54eb22cb57">
-      <Terms xmlns="http://schemas.microsoft.com/office/infopath/2007/PartnerControls"/>
-    </o915802bd8fb417bbe5f6f423fd076a0>
-    <TaxKeywordTaxHTField xmlns="230e9df3-be65-4c73-a93b-d1236ebd677e">
-      <Terms xmlns="http://schemas.microsoft.com/office/infopath/2007/PartnerControls">
-        <TermInfo xmlns="http://schemas.microsoft.com/office/infopath/2007/PartnerControls">
-          <TermName xmlns="http://schemas.microsoft.com/office/infopath/2007/PartnerControls">NDC - ASP.NET 5</TermName>
-          <TermId xmlns="http://schemas.microsoft.com/office/infopath/2007/PartnerControls">2a894afe-c5d7-4c19-abd1-299f20d98c6d</TermId>
-        </TermInfo>
-      </Terms>
-    </TaxKeywordTaxHTField>
-    <i23d7ba649194ae1bace8707520bbe5b xmlns="e36bfbf9-5e42-489c-a259-4c54eb22cb57">
-      <Terms xmlns="http://schemas.microsoft.com/office/infopath/2007/PartnerControls">
-        <TermInfo xmlns="http://schemas.microsoft.com/office/infopath/2007/PartnerControls">
-          <TermName xmlns="http://schemas.microsoft.com/office/infopath/2007/PartnerControls">TechReady</TermName>
-          <TermId xmlns="http://schemas.microsoft.com/office/infopath/2007/PartnerControls">ebdf1b7d-d34f-4ccf-ac45-ca5a756d5c65</TermId>
-        </TermInfo>
-      </Terms>
-    </i23d7ba649194ae1bace8707520bbe5b>
-    <l3c4e8b902d24cac82560b32d42c7cb4 xmlns="e36bfbf9-5e42-489c-a259-4c54eb22cb57">
-      <Terms xmlns="http://schemas.microsoft.com/office/infopath/2007/PartnerControls">
-        <TermInfo xmlns="http://schemas.microsoft.com/office/infopath/2007/PartnerControls">
-          <TermName xmlns="http://schemas.microsoft.com/office/infopath/2007/PartnerControls">Seattle</TermName>
-          <TermId xmlns="http://schemas.microsoft.com/office/infopath/2007/PartnerControls">54f46ed2-c77e-4a59-b182-a4171fdb0d11</TermId>
-        </TermInfo>
-      </Terms>
-    </l3c4e8b902d24cac82560b32d42c7cb4>
-    <RatedBy xmlns="http://schemas.microsoft.com/sharepoint/v3">
-      <UserInfo>
-        <DisplayName/>
-        <AccountId xsi:nil="true"/>
-        <AccountType/>
-      </UserInfo>
-    </RatedBy>
-  </documentManagement>
-</p:properties>
-</file>
-
-<file path=customXml/item3.xml><?xml version="1.0" encoding="utf-8"?>
-<?mso-contentType ?>
-<FormTemplates xmlns="http://schemas.microsoft.com/sharepoint/v3/contenttype/forms">
-  <Display>DocumentLibraryForm</Display>
-  <Edit>DocumentLibraryForm</Edit>
-  <New>DocumentLibraryForm</New>
-</FormTemplates>
-</file>
-
 <file path=customXml/itemProps1.xml><?xml version="1.0" encoding="utf-8"?>
-<ds:datastoreItem xmlns:ds="http://schemas.openxmlformats.org/officeDocument/2006/customXml" ds:itemID="{33CAB5FC-3224-439A-8A87-66BDC350A19B}">
+<ds:datastoreItem xmlns:ds="http://schemas.openxmlformats.org/officeDocument/2006/customXml" ds:itemID="{758FDAC0-319D-4A54-8D8E-1D42CB1F8004}">
   <ds:schemaRefs>
-    <ds:schemaRef ds:uri="http://schemas.microsoft.com/office/2006/metadata/contentType"/>
-    <ds:schemaRef ds:uri="http://schemas.microsoft.com/office/2006/metadata/properties/metaAttributes"/>
-    <ds:schemaRef ds:uri="http://www.w3.org/2001/XMLSchema"/>
-    <ds:schemaRef ds:uri="http://schemas.microsoft.com/office/2006/metadata/properties"/>
-    <ds:schemaRef ds:uri="http://schemas.microsoft.com/sharepoint/v3"/>
-    <ds:schemaRef ds:uri="e36bfbf9-5e42-489c-a259-4c54eb22cb57"/>
-    <ds:schemaRef ds:uri="230e9df3-be65-4c73-a93b-d1236ebd677e"/>
-    <ds:schemaRef ds:uri="http://schemas.microsoft.com/office/2006/documentManagement/types"/>
-    <ds:schemaRef ds:uri="http://schemas.microsoft.com/office/infopath/2007/PartnerControls"/>
-    <ds:schemaRef ds:uri="http://schemas.openxmlformats.org/package/2006/metadata/core-properties"/>
-    <ds:schemaRef ds:uri="http://purl.org/dc/elements/1.1/"/>
-    <ds:schemaRef ds:uri="http://purl.org/dc/terms/"/>
-    <ds:schemaRef ds:uri="http://schemas.microsoft.com/internal/obd"/>
+    <ds:schemaRef ds:uri="http://schemas.microsoft.com/sharepoint/v3/contenttype/forms"/>
   </ds:schemaRefs>
 </ds:datastoreItem>
 </file>
@@ -12211,9 +12199,21 @@
 </file>
 
 <file path=customXml/itemProps3.xml><?xml version="1.0" encoding="utf-8"?>
-<ds:datastoreItem xmlns:ds="http://schemas.openxmlformats.org/officeDocument/2006/customXml" ds:itemID="{758FDAC0-319D-4A54-8D8E-1D42CB1F8004}">
+<ds:datastoreItem xmlns:ds="http://schemas.openxmlformats.org/officeDocument/2006/customXml" ds:itemID="{33CAB5FC-3224-439A-8A87-66BDC350A19B}">
   <ds:schemaRefs>
-    <ds:schemaRef ds:uri="http://schemas.microsoft.com/sharepoint/v3/contenttype/forms"/>
+    <ds:schemaRef ds:uri="http://schemas.microsoft.com/office/2006/metadata/contentType"/>
+    <ds:schemaRef ds:uri="http://schemas.microsoft.com/office/2006/metadata/properties/metaAttributes"/>
+    <ds:schemaRef ds:uri="http://www.w3.org/2001/XMLSchema"/>
+    <ds:schemaRef ds:uri="http://schemas.microsoft.com/office/2006/metadata/properties"/>
+    <ds:schemaRef ds:uri="http://schemas.microsoft.com/sharepoint/v3"/>
+    <ds:schemaRef ds:uri="e36bfbf9-5e42-489c-a259-4c54eb22cb57"/>
+    <ds:schemaRef ds:uri="230e9df3-be65-4c73-a93b-d1236ebd677e"/>
+    <ds:schemaRef ds:uri="http://schemas.microsoft.com/office/2006/documentManagement/types"/>
+    <ds:schemaRef ds:uri="http://schemas.microsoft.com/office/infopath/2007/PartnerControls"/>
+    <ds:schemaRef ds:uri="http://schemas.openxmlformats.org/package/2006/metadata/core-properties"/>
+    <ds:schemaRef ds:uri="http://purl.org/dc/elements/1.1/"/>
+    <ds:schemaRef ds:uri="http://purl.org/dc/terms/"/>
+    <ds:schemaRef ds:uri="http://schemas.microsoft.com/internal/obd"/>
   </ds:schemaRefs>
 </ds:datastoreItem>
 </file>
</xml_diff>